<commit_message>
WBIR PowerPoint teaser slide content
</commit_message>
<xml_diff>
--- a/doc/WBIR2020-graphical-abstract.pptx
+++ b/doc/WBIR2020-graphical-abstract.pptx
@@ -104,6 +104,11 @@
       </a:defRPr>
     </a:lvl9pPr>
   </p:defaultTextStyle>
+  <p:extLst>
+    <p:ext uri="{EFAFB233-063F-42B5-8137-9DF3F51BA10A}">
+      <p15:sldGuideLst xmlns:p15="http://schemas.microsoft.com/office/powerpoint/2012/main"/>
+    </p:ext>
+  </p:extLst>
 </p:presentation>
 </file>
 
@@ -254,7 +259,7 @@
           <a:p>
             <a:fld id="{0CF54712-54AA-D942-A523-CC0955A73963}" type="datetimeFigureOut">
               <a:rPr lang="en-US" smtClean="0"/>
-              <a:t>5/15/20</a:t>
+              <a:t>2020-11-20</a:t>
             </a:fld>
             <a:endParaRPr lang="en-US"/>
           </a:p>
@@ -452,7 +457,7 @@
           <a:p>
             <a:fld id="{0CF54712-54AA-D942-A523-CC0955A73963}" type="datetimeFigureOut">
               <a:rPr lang="en-US" smtClean="0"/>
-              <a:t>5/15/20</a:t>
+              <a:t>2020-11-20</a:t>
             </a:fld>
             <a:endParaRPr lang="en-US"/>
           </a:p>
@@ -660,7 +665,7 @@
           <a:p>
             <a:fld id="{0CF54712-54AA-D942-A523-CC0955A73963}" type="datetimeFigureOut">
               <a:rPr lang="en-US" smtClean="0"/>
-              <a:t>5/15/20</a:t>
+              <a:t>2020-11-20</a:t>
             </a:fld>
             <a:endParaRPr lang="en-US"/>
           </a:p>
@@ -858,7 +863,7 @@
           <a:p>
             <a:fld id="{0CF54712-54AA-D942-A523-CC0955A73963}" type="datetimeFigureOut">
               <a:rPr lang="en-US" smtClean="0"/>
-              <a:t>5/15/20</a:t>
+              <a:t>2020-11-20</a:t>
             </a:fld>
             <a:endParaRPr lang="en-US"/>
           </a:p>
@@ -1133,7 +1138,7 @@
           <a:p>
             <a:fld id="{0CF54712-54AA-D942-A523-CC0955A73963}" type="datetimeFigureOut">
               <a:rPr lang="en-US" smtClean="0"/>
-              <a:t>5/15/20</a:t>
+              <a:t>2020-11-20</a:t>
             </a:fld>
             <a:endParaRPr lang="en-US"/>
           </a:p>
@@ -1398,7 +1403,7 @@
           <a:p>
             <a:fld id="{0CF54712-54AA-D942-A523-CC0955A73963}" type="datetimeFigureOut">
               <a:rPr lang="en-US" smtClean="0"/>
-              <a:t>5/15/20</a:t>
+              <a:t>2020-11-20</a:t>
             </a:fld>
             <a:endParaRPr lang="en-US"/>
           </a:p>
@@ -1810,7 +1815,7 @@
           <a:p>
             <a:fld id="{0CF54712-54AA-D942-A523-CC0955A73963}" type="datetimeFigureOut">
               <a:rPr lang="en-US" smtClean="0"/>
-              <a:t>5/15/20</a:t>
+              <a:t>2020-11-20</a:t>
             </a:fld>
             <a:endParaRPr lang="en-US"/>
           </a:p>
@@ -1951,7 +1956,7 @@
           <a:p>
             <a:fld id="{0CF54712-54AA-D942-A523-CC0955A73963}" type="datetimeFigureOut">
               <a:rPr lang="en-US" smtClean="0"/>
-              <a:t>5/15/20</a:t>
+              <a:t>2020-11-20</a:t>
             </a:fld>
             <a:endParaRPr lang="en-US"/>
           </a:p>
@@ -2064,7 +2069,7 @@
           <a:p>
             <a:fld id="{0CF54712-54AA-D942-A523-CC0955A73963}" type="datetimeFigureOut">
               <a:rPr lang="en-US" smtClean="0"/>
-              <a:t>5/15/20</a:t>
+              <a:t>2020-11-20</a:t>
             </a:fld>
             <a:endParaRPr lang="en-US"/>
           </a:p>
@@ -2375,7 +2380,7 @@
           <a:p>
             <a:fld id="{0CF54712-54AA-D942-A523-CC0955A73963}" type="datetimeFigureOut">
               <a:rPr lang="en-US" smtClean="0"/>
-              <a:t>5/15/20</a:t>
+              <a:t>2020-11-20</a:t>
             </a:fld>
             <a:endParaRPr lang="en-US"/>
           </a:p>
@@ -2663,7 +2668,7 @@
           <a:p>
             <a:fld id="{0CF54712-54AA-D942-A523-CC0955A73963}" type="datetimeFigureOut">
               <a:rPr lang="en-US" smtClean="0"/>
-              <a:t>5/15/20</a:t>
+              <a:t>2020-11-20</a:t>
             </a:fld>
             <a:endParaRPr lang="en-US"/>
           </a:p>
@@ -2904,7 +2909,7 @@
           <a:p>
             <a:fld id="{0CF54712-54AA-D942-A523-CC0955A73963}" type="datetimeFigureOut">
               <a:rPr lang="en-US" smtClean="0"/>
-              <a:t>5/15/20</a:t>
+              <a:t>2020-11-20</a:t>
             </a:fld>
             <a:endParaRPr lang="en-US"/>
           </a:p>
@@ -3321,6 +3326,36 @@
           <a:chExt cx="0" cy="0"/>
         </a:xfrm>
       </p:grpSpPr>
+      <p:pic>
+        <p:nvPicPr>
+          <p:cNvPr id="9" name="Picture 8" descr="Application screenshot&#10;&#10;Left: fixed image&#10;Middle: moving image&#10;Right: checkerboard of fixed and moving images.">
+            <a:extLst>
+              <a:ext uri="{FF2B5EF4-FFF2-40B4-BE49-F238E27FC236}">
+                <a16:creationId xmlns:a16="http://schemas.microsoft.com/office/drawing/2014/main" id="{B09F03CC-F82F-4EE1-AEF0-A03E297D8A73}"/>
+              </a:ext>
+            </a:extLst>
+          </p:cNvPr>
+          <p:cNvPicPr>
+            <a:picLocks noChangeAspect="1"/>
+          </p:cNvPicPr>
+          <p:nvPr/>
+        </p:nvPicPr>
+        <p:blipFill>
+          <a:blip r:embed="rId2"/>
+          <a:stretch>
+            <a:fillRect/>
+          </a:stretch>
+        </p:blipFill>
+        <p:spPr>
+          <a:xfrm>
+            <a:off x="5739143" y="1389232"/>
+            <a:ext cx="6400666" cy="3682093"/>
+          </a:xfrm>
+          <a:prstGeom prst="rect">
+            <a:avLst/>
+          </a:prstGeom>
+        </p:spPr>
+      </p:pic>
       <p:sp>
         <p:nvSpPr>
           <p:cNvPr id="2" name="Title 1">
@@ -3351,14 +3386,44 @@
           <a:p>
             <a:r>
               <a:rPr lang="en-US" dirty="0"/>
-              <a:t>Project Title Project Title Project Title Project Title</a:t>
+              <a:t>Web-based Registration Tools Based on ITKElastix</a:t>
             </a:r>
             <a:br>
               <a:rPr lang="en-US" dirty="0"/>
             </a:br>
             <a:r>
+              <a:rPr lang="bs-Latn-BA" sz="2200" dirty="0">
+                <a:hlinkClick r:id="rId3"/>
+              </a:rPr>
+              <a:t>Dženan </a:t>
+            </a:r>
+            <a:r>
+              <a:rPr lang="bs-Latn-BA" sz="2200" dirty="0" err="1">
+                <a:hlinkClick r:id="rId3"/>
+              </a:rPr>
+              <a:t>Zukić</a:t>
+            </a:r>
+            <a:r>
               <a:rPr lang="en-US" sz="2200" dirty="0"/>
-              <a:t>Name1 &amp; Name2</a:t>
+              <a:t> &amp; </a:t>
+            </a:r>
+            <a:r>
+              <a:rPr lang="bs-Latn-BA" sz="2200" dirty="0" err="1">
+                <a:hlinkClick r:id="rId4"/>
+              </a:rPr>
+              <a:t>Matt</a:t>
+            </a:r>
+            <a:r>
+              <a:rPr lang="bs-Latn-BA" sz="2200" dirty="0">
+                <a:hlinkClick r:id="rId4"/>
+              </a:rPr>
+              <a:t> </a:t>
+            </a:r>
+            <a:r>
+              <a:rPr lang="bs-Latn-BA" sz="2200" dirty="0" err="1">
+                <a:hlinkClick r:id="rId4"/>
+              </a:rPr>
+              <a:t>McCormick</a:t>
             </a:r>
             <a:endParaRPr lang="en-US" dirty="0"/>
           </a:p>
@@ -3383,7 +3448,7 @@
         <p:spPr>
           <a:xfrm>
             <a:off x="403303" y="1223458"/>
-            <a:ext cx="5506843" cy="5288853"/>
+            <a:ext cx="5692697" cy="5463092"/>
           </a:xfrm>
         </p:spPr>
         <p:txBody>
@@ -3394,684 +3459,128 @@
           <a:p>
             <a:r>
               <a:rPr lang="en-US" dirty="0"/>
-              <a:t>Highlights</a:t>
+              <a:t>Web-based tools</a:t>
             </a:r>
           </a:p>
           <a:p>
             <a:pPr lvl="1"/>
             <a:r>
               <a:rPr lang="en-US" dirty="0"/>
-              <a:t>Lorem ipsum dolor sit </a:t>
-            </a:r>
-            <a:r>
-              <a:rPr lang="en-US" dirty="0" err="1"/>
-              <a:t>amet</a:t>
-            </a:r>
+              <a:t>No need to install</a:t>
+            </a:r>
+          </a:p>
+          <a:p>
+            <a:pPr lvl="1"/>
             <a:r>
               <a:rPr lang="en-US" dirty="0"/>
-              <a:t>, </a:t>
+              <a:t>No user-side maintenance</a:t>
             </a:r>
           </a:p>
           <a:p>
             <a:pPr lvl="1"/>
             <a:r>
-              <a:rPr lang="en-US" dirty="0" err="1"/>
-              <a:t>consectetur</a:t>
-            </a:r>
-            <a:r>
               <a:rPr lang="en-US" dirty="0"/>
-              <a:t> </a:t>
-            </a:r>
-            <a:r>
-              <a:rPr lang="en-US" dirty="0" err="1"/>
-              <a:t>adipiscing</a:t>
-            </a:r>
+              <a:t>Reaches wider audience</a:t>
+            </a:r>
+          </a:p>
+          <a:p>
             <a:r>
               <a:rPr lang="en-US" dirty="0"/>
-              <a:t> </a:t>
-            </a:r>
-            <a:r>
-              <a:rPr lang="en-US" dirty="0" err="1"/>
-              <a:t>elit</a:t>
-            </a:r>
+              <a:t>Open source @ GitHub</a:t>
+            </a:r>
+          </a:p>
+          <a:p>
+            <a:pPr lvl="1"/>
+            <a:r>
+              <a:rPr lang="en-US" dirty="0">
+                <a:hlinkClick r:id="rId5"/>
+              </a:rPr>
+              <a:t>InsightSoftwareConsortium/ITKElastix</a:t>
+            </a:r>
+            <a:endParaRPr lang="en-US" dirty="0"/>
+          </a:p>
+          <a:p>
+            <a:pPr lvl="1"/>
+            <a:r>
+              <a:rPr lang="en-US" sz="2350" dirty="0">
+                <a:hlinkClick r:id="rId6"/>
+              </a:rPr>
+              <a:t>InsightSoftwareConsortium/</a:t>
+            </a:r>
+            <a:r>
+              <a:rPr lang="en-US" sz="2350" dirty="0" err="1">
+                <a:hlinkClick r:id="rId6"/>
+              </a:rPr>
+              <a:t>itkwidgets</a:t>
+            </a:r>
+            <a:endParaRPr lang="en-US" sz="2350" dirty="0"/>
+          </a:p>
+          <a:p>
+            <a:pPr lvl="1"/>
+            <a:r>
+              <a:rPr lang="en-US" dirty="0" err="1">
+                <a:hlinkClick r:id="rId7"/>
+              </a:rPr>
+              <a:t>KitwareMedical</a:t>
+            </a:r>
+            <a:r>
+              <a:rPr lang="en-US" dirty="0">
+                <a:hlinkClick r:id="rId7"/>
+              </a:rPr>
+              <a:t>/HASI</a:t>
+            </a:r>
+            <a:endParaRPr lang="en-US" dirty="0"/>
+          </a:p>
+          <a:p>
+            <a:pPr lvl="1"/>
+            <a:r>
+              <a:rPr lang="en-US" dirty="0">
+                <a:latin typeface="Courier New" panose="02070309020205020404" pitchFamily="49" charset="0"/>
+                <a:cs typeface="Courier New" panose="02070309020205020404" pitchFamily="49" charset="0"/>
+              </a:rPr>
+              <a:t>pip install </a:t>
+            </a:r>
+            <a:r>
+              <a:rPr lang="en-US" dirty="0" err="1">
+                <a:latin typeface="Courier New" panose="02070309020205020404" pitchFamily="49" charset="0"/>
+                <a:cs typeface="Courier New" panose="02070309020205020404" pitchFamily="49" charset="0"/>
+              </a:rPr>
+              <a:t>itk-elastix</a:t>
+            </a:r>
+            <a:endParaRPr lang="en-US" dirty="0">
+              <a:latin typeface="Courier New" panose="02070309020205020404" pitchFamily="49" charset="0"/>
+              <a:cs typeface="Courier New" panose="02070309020205020404" pitchFamily="49" charset="0"/>
+            </a:endParaRPr>
+          </a:p>
+          <a:p>
+            <a:pPr lvl="1"/>
             <a:r>
               <a:rPr lang="en-US" dirty="0"/>
-              <a:t> </a:t>
+              <a:t>C++ with Python wrapping</a:t>
+            </a:r>
+          </a:p>
+          <a:p>
+            <a:r>
+              <a:rPr lang="en-US" dirty="0"/>
+              <a:t>Limitations and future work</a:t>
             </a:r>
           </a:p>
           <a:p>
             <a:pPr lvl="1"/>
             <a:r>
               <a:rPr lang="en-US" dirty="0"/>
-              <a:t>Maecenas </a:t>
-            </a:r>
-            <a:r>
-              <a:rPr lang="en-US" dirty="0" err="1"/>
-              <a:t>interdum</a:t>
-            </a:r>
+              <a:t>Very large images</a:t>
+            </a:r>
+          </a:p>
+          <a:p>
+            <a:pPr lvl="1"/>
             <a:r>
               <a:rPr lang="en-US" dirty="0"/>
-              <a:t> </a:t>
-            </a:r>
-            <a:r>
-              <a:rPr lang="en-US" dirty="0" err="1"/>
-              <a:t>feugiat</a:t>
-            </a:r>
-            <a:r>
-              <a:rPr lang="en-US" dirty="0"/>
-              <a:t> mi,  </a:t>
-            </a:r>
-          </a:p>
-          <a:p>
-            <a:r>
-              <a:rPr lang="en-US" dirty="0"/>
-              <a:t>Findings</a:t>
-            </a:r>
-          </a:p>
-          <a:p>
-            <a:pPr lvl="1"/>
-            <a:r>
-              <a:rPr lang="en-US" dirty="0" err="1"/>
-              <a:t>Pellentesque</a:t>
-            </a:r>
-            <a:r>
-              <a:rPr lang="en-US" dirty="0"/>
-              <a:t> </a:t>
-            </a:r>
-            <a:r>
-              <a:rPr lang="en-US" dirty="0" err="1"/>
-              <a:t>ut</a:t>
-            </a:r>
-            <a:r>
-              <a:rPr lang="en-US" dirty="0"/>
-              <a:t> </a:t>
-            </a:r>
-            <a:r>
-              <a:rPr lang="en-US" dirty="0" err="1"/>
-              <a:t>nisl</a:t>
-            </a:r>
-            <a:r>
-              <a:rPr lang="en-US" dirty="0"/>
-              <a:t> </a:t>
-            </a:r>
-            <a:r>
-              <a:rPr lang="en-US" dirty="0" err="1"/>
-              <a:t>auctor</a:t>
-            </a:r>
-            <a:r>
-              <a:rPr lang="en-US" dirty="0"/>
-              <a:t>,  </a:t>
-            </a:r>
-          </a:p>
-          <a:p>
-            <a:pPr lvl="1"/>
-            <a:r>
-              <a:rPr lang="en-US" dirty="0" err="1"/>
-              <a:t>aliquet</a:t>
-            </a:r>
-            <a:r>
-              <a:rPr lang="en-US" dirty="0"/>
-              <a:t> </a:t>
-            </a:r>
-            <a:r>
-              <a:rPr lang="en-US" dirty="0" err="1"/>
-              <a:t>erat</a:t>
-            </a:r>
-            <a:r>
-              <a:rPr lang="en-US" dirty="0"/>
-              <a:t> a, </a:t>
-            </a:r>
-            <a:r>
-              <a:rPr lang="en-US" dirty="0" err="1"/>
-              <a:t>luctus</a:t>
-            </a:r>
-            <a:r>
-              <a:rPr lang="en-US" dirty="0"/>
-              <a:t> dolor</a:t>
-            </a:r>
-          </a:p>
-          <a:p>
-            <a:r>
-              <a:rPr lang="en-US" dirty="0"/>
-              <a:t>Interesting observations</a:t>
-            </a:r>
-          </a:p>
-          <a:p>
-            <a:pPr lvl="1"/>
-            <a:r>
-              <a:rPr lang="en-US" dirty="0" err="1"/>
-              <a:t>Donec</a:t>
-            </a:r>
-            <a:r>
-              <a:rPr lang="en-US" dirty="0"/>
-              <a:t> id </a:t>
-            </a:r>
-            <a:r>
-              <a:rPr lang="en-US" dirty="0" err="1"/>
-              <a:t>suscipit</a:t>
-            </a:r>
-            <a:r>
-              <a:rPr lang="en-US" dirty="0"/>
-              <a:t> </a:t>
-            </a:r>
-            <a:r>
-              <a:rPr lang="en-US" dirty="0" err="1"/>
-              <a:t>purus</a:t>
-            </a:r>
-            <a:r>
-              <a:rPr lang="en-US" dirty="0"/>
-              <a:t>, </a:t>
-            </a:r>
-          </a:p>
-          <a:p>
-            <a:pPr lvl="1"/>
-            <a:r>
-              <a:rPr lang="en-US" dirty="0" err="1"/>
-              <a:t>ut</a:t>
-            </a:r>
-            <a:r>
-              <a:rPr lang="en-US" dirty="0"/>
-              <a:t> </a:t>
-            </a:r>
-            <a:r>
-              <a:rPr lang="en-US" dirty="0" err="1"/>
-              <a:t>dapibus</a:t>
-            </a:r>
-            <a:r>
-              <a:rPr lang="en-US" dirty="0"/>
-              <a:t> </a:t>
-            </a:r>
-            <a:r>
-              <a:rPr lang="en-US" dirty="0" err="1"/>
-              <a:t>quam</a:t>
-            </a:r>
-            <a:r>
-              <a:rPr lang="en-US" dirty="0"/>
-              <a:t>.</a:t>
-            </a:r>
-          </a:p>
-          <a:p>
-            <a:r>
-              <a:rPr lang="en-US" dirty="0"/>
-              <a:t>Learning experience</a:t>
-            </a:r>
-          </a:p>
-          <a:p>
-            <a:pPr lvl="1"/>
-            <a:r>
-              <a:rPr lang="en-US" dirty="0" err="1"/>
-              <a:t>Pellentesque</a:t>
-            </a:r>
-            <a:r>
-              <a:rPr lang="en-US" dirty="0"/>
-              <a:t> sit </a:t>
-            </a:r>
-            <a:r>
-              <a:rPr lang="en-US" dirty="0" err="1"/>
-              <a:t>amet</a:t>
-            </a:r>
-            <a:r>
-              <a:rPr lang="en-US" dirty="0"/>
-              <a:t> </a:t>
-            </a:r>
-            <a:r>
-              <a:rPr lang="en-US" dirty="0" err="1"/>
-              <a:t>sem</a:t>
-            </a:r>
-            <a:r>
-              <a:rPr lang="en-US" dirty="0"/>
-              <a:t> </a:t>
-            </a:r>
-            <a:r>
-              <a:rPr lang="en-US" dirty="0" err="1"/>
-              <a:t>lectus</a:t>
-            </a:r>
-            <a:endParaRPr lang="en-US" dirty="0"/>
-          </a:p>
-          <a:p>
-            <a:pPr lvl="1"/>
-            <a:endParaRPr lang="en-US" dirty="0"/>
-          </a:p>
-        </p:txBody>
-      </p:sp>
-      <p:sp>
-        <p:nvSpPr>
-          <p:cNvPr id="5" name="Rectangle 4">
-            <a:extLst>
-              <a:ext uri="{FF2B5EF4-FFF2-40B4-BE49-F238E27FC236}">
-                <a16:creationId xmlns:a16="http://schemas.microsoft.com/office/drawing/2014/main" id="{1DB78835-D553-1640-93A1-063592D8A140}"/>
-              </a:ext>
-            </a:extLst>
-          </p:cNvPr>
-          <p:cNvSpPr/>
-          <p:nvPr/>
-        </p:nvSpPr>
-        <p:spPr>
-          <a:xfrm>
-            <a:off x="5661103" y="1550378"/>
-            <a:ext cx="2999678" cy="2932771"/>
-          </a:xfrm>
-          <a:prstGeom prst="rect">
-            <a:avLst/>
-          </a:prstGeom>
-        </p:spPr>
-        <p:style>
-          <a:lnRef idx="2">
-            <a:schemeClr val="accent1">
-              <a:shade val="50000"/>
-            </a:schemeClr>
-          </a:lnRef>
-          <a:fillRef idx="1">
-            <a:schemeClr val="accent1"/>
-          </a:fillRef>
-          <a:effectRef idx="0">
-            <a:schemeClr val="accent1"/>
-          </a:effectRef>
-          <a:fontRef idx="minor">
-            <a:schemeClr val="lt1"/>
-          </a:fontRef>
-        </p:style>
-        <p:txBody>
-          <a:bodyPr rtlCol="0" anchor="ctr"/>
-          <a:lstStyle/>
-          <a:p>
-            <a:pPr algn="ctr"/>
-            <a:endParaRPr lang="en-US"/>
-          </a:p>
-        </p:txBody>
-      </p:sp>
-      <p:sp>
-        <p:nvSpPr>
-          <p:cNvPr id="6" name="Rectangle 5">
-            <a:extLst>
-              <a:ext uri="{FF2B5EF4-FFF2-40B4-BE49-F238E27FC236}">
-                <a16:creationId xmlns:a16="http://schemas.microsoft.com/office/drawing/2014/main" id="{BD545053-B693-304A-8E48-A8D26C065CFE}"/>
-              </a:ext>
-            </a:extLst>
-          </p:cNvPr>
-          <p:cNvSpPr/>
-          <p:nvPr/>
-        </p:nvSpPr>
-        <p:spPr>
-          <a:xfrm>
-            <a:off x="8917260" y="1550378"/>
-            <a:ext cx="2999678" cy="2932771"/>
-          </a:xfrm>
-          <a:prstGeom prst="rect">
-            <a:avLst/>
-          </a:prstGeom>
-        </p:spPr>
-        <p:style>
-          <a:lnRef idx="2">
-            <a:schemeClr val="accent1">
-              <a:shade val="50000"/>
-            </a:schemeClr>
-          </a:lnRef>
-          <a:fillRef idx="1">
-            <a:schemeClr val="accent1"/>
-          </a:fillRef>
-          <a:effectRef idx="0">
-            <a:schemeClr val="accent1"/>
-          </a:effectRef>
-          <a:fontRef idx="minor">
-            <a:schemeClr val="lt1"/>
-          </a:fontRef>
-        </p:style>
-        <p:txBody>
-          <a:bodyPr rtlCol="0" anchor="ctr"/>
-          <a:lstStyle/>
-          <a:p>
-            <a:pPr algn="ctr"/>
-            <a:endParaRPr lang="en-US"/>
-          </a:p>
-        </p:txBody>
-      </p:sp>
-      <p:graphicFrame>
-        <p:nvGraphicFramePr>
-          <p:cNvPr id="7" name="Table 6">
-            <a:extLst>
-              <a:ext uri="{FF2B5EF4-FFF2-40B4-BE49-F238E27FC236}">
-                <a16:creationId xmlns:a16="http://schemas.microsoft.com/office/drawing/2014/main" id="{654B4631-698F-D34B-8924-0AF139806DF0}"/>
-              </a:ext>
-            </a:extLst>
-          </p:cNvPr>
-          <p:cNvGraphicFramePr>
-            <a:graphicFrameLocks noGrp="1"/>
-          </p:cNvGraphicFramePr>
-          <p:nvPr>
-            <p:extLst>
-              <p:ext uri="{D42A27DB-BD31-4B8C-83A1-F6EECF244321}">
-                <p14:modId xmlns:p14="http://schemas.microsoft.com/office/powerpoint/2010/main" val="2359054813"/>
-              </p:ext>
-            </p:extLst>
-          </p:nvPr>
-        </p:nvGraphicFramePr>
-        <p:xfrm>
-          <a:off x="5661103" y="4810069"/>
-          <a:ext cx="6234463" cy="1483360"/>
-        </p:xfrm>
-        <a:graphic>
-          <a:graphicData uri="http://schemas.openxmlformats.org/drawingml/2006/table">
-            <a:tbl>
-              <a:tblPr firstRow="1" bandRow="1">
-                <a:tableStyleId>{5C22544A-7EE6-4342-B048-85BDC9FD1C3A}</a:tableStyleId>
-              </a:tblPr>
-              <a:tblGrid>
-                <a:gridCol w="1609493">
-                  <a:extLst>
-                    <a:ext uri="{9D8B030D-6E8A-4147-A177-3AD203B41FA5}">
-                      <a16:colId xmlns:a16="http://schemas.microsoft.com/office/drawing/2014/main" val="380581930"/>
-                    </a:ext>
-                  </a:extLst>
-                </a:gridCol>
-                <a:gridCol w="924994">
-                  <a:extLst>
-                    <a:ext uri="{9D8B030D-6E8A-4147-A177-3AD203B41FA5}">
-                      <a16:colId xmlns:a16="http://schemas.microsoft.com/office/drawing/2014/main" val="1727961122"/>
-                    </a:ext>
-                  </a:extLst>
-                </a:gridCol>
-                <a:gridCol w="924994">
-                  <a:extLst>
-                    <a:ext uri="{9D8B030D-6E8A-4147-A177-3AD203B41FA5}">
-                      <a16:colId xmlns:a16="http://schemas.microsoft.com/office/drawing/2014/main" val="2843151102"/>
-                    </a:ext>
-                  </a:extLst>
-                </a:gridCol>
-                <a:gridCol w="924994">
-                  <a:extLst>
-                    <a:ext uri="{9D8B030D-6E8A-4147-A177-3AD203B41FA5}">
-                      <a16:colId xmlns:a16="http://schemas.microsoft.com/office/drawing/2014/main" val="4177040244"/>
-                    </a:ext>
-                  </a:extLst>
-                </a:gridCol>
-                <a:gridCol w="924994">
-                  <a:extLst>
-                    <a:ext uri="{9D8B030D-6E8A-4147-A177-3AD203B41FA5}">
-                      <a16:colId xmlns:a16="http://schemas.microsoft.com/office/drawing/2014/main" val="3497782431"/>
-                    </a:ext>
-                  </a:extLst>
-                </a:gridCol>
-                <a:gridCol w="924994">
-                  <a:extLst>
-                    <a:ext uri="{9D8B030D-6E8A-4147-A177-3AD203B41FA5}">
-                      <a16:colId xmlns:a16="http://schemas.microsoft.com/office/drawing/2014/main" val="1125822578"/>
-                    </a:ext>
-                  </a:extLst>
-                </a:gridCol>
-              </a:tblGrid>
-              <a:tr h="370840">
-                <a:tc>
-                  <a:txBody>
-                    <a:bodyPr/>
-                    <a:lstStyle/>
-                    <a:p>
-                      <a:endParaRPr lang="en-US" dirty="0"/>
-                    </a:p>
-                  </a:txBody>
-                  <a:tcPr/>
-                </a:tc>
-                <a:tc>
-                  <a:txBody>
-                    <a:bodyPr/>
-                    <a:lstStyle/>
-                    <a:p>
-                      <a:endParaRPr lang="en-US" dirty="0"/>
-                    </a:p>
-                  </a:txBody>
-                  <a:tcPr/>
-                </a:tc>
-                <a:tc>
-                  <a:txBody>
-                    <a:bodyPr/>
-                    <a:lstStyle/>
-                    <a:p>
-                      <a:endParaRPr lang="en-US" dirty="0"/>
-                    </a:p>
-                  </a:txBody>
-                  <a:tcPr/>
-                </a:tc>
-                <a:tc>
-                  <a:txBody>
-                    <a:bodyPr/>
-                    <a:lstStyle/>
-                    <a:p>
-                      <a:endParaRPr lang="en-US" dirty="0"/>
-                    </a:p>
-                  </a:txBody>
-                  <a:tcPr/>
-                </a:tc>
-                <a:tc>
-                  <a:txBody>
-                    <a:bodyPr/>
-                    <a:lstStyle/>
-                    <a:p>
-                      <a:endParaRPr lang="en-US" dirty="0"/>
-                    </a:p>
-                  </a:txBody>
-                  <a:tcPr/>
-                </a:tc>
-                <a:tc>
-                  <a:txBody>
-                    <a:bodyPr/>
-                    <a:lstStyle/>
-                    <a:p>
-                      <a:endParaRPr lang="en-US" dirty="0"/>
-                    </a:p>
-                  </a:txBody>
-                  <a:tcPr/>
-                </a:tc>
-                <a:extLst>
-                  <a:ext uri="{0D108BD9-81ED-4DB2-BD59-A6C34878D82A}">
-                    <a16:rowId xmlns:a16="http://schemas.microsoft.com/office/drawing/2014/main" val="1530381631"/>
-                  </a:ext>
-                </a:extLst>
-              </a:tr>
-              <a:tr h="370840">
-                <a:tc>
-                  <a:txBody>
-                    <a:bodyPr/>
-                    <a:lstStyle/>
-                    <a:p>
-                      <a:endParaRPr lang="en-US" dirty="0"/>
-                    </a:p>
-                  </a:txBody>
-                  <a:tcPr/>
-                </a:tc>
-                <a:tc>
-                  <a:txBody>
-                    <a:bodyPr/>
-                    <a:lstStyle/>
-                    <a:p>
-                      <a:endParaRPr lang="en-US"/>
-                    </a:p>
-                  </a:txBody>
-                  <a:tcPr/>
-                </a:tc>
-                <a:tc>
-                  <a:txBody>
-                    <a:bodyPr/>
-                    <a:lstStyle/>
-                    <a:p>
-                      <a:endParaRPr lang="en-US"/>
-                    </a:p>
-                  </a:txBody>
-                  <a:tcPr/>
-                </a:tc>
-                <a:tc>
-                  <a:txBody>
-                    <a:bodyPr/>
-                    <a:lstStyle/>
-                    <a:p>
-                      <a:endParaRPr lang="en-US"/>
-                    </a:p>
-                  </a:txBody>
-                  <a:tcPr/>
-                </a:tc>
-                <a:tc>
-                  <a:txBody>
-                    <a:bodyPr/>
-                    <a:lstStyle/>
-                    <a:p>
-                      <a:endParaRPr lang="en-US"/>
-                    </a:p>
-                  </a:txBody>
-                  <a:tcPr/>
-                </a:tc>
-                <a:tc>
-                  <a:txBody>
-                    <a:bodyPr/>
-                    <a:lstStyle/>
-                    <a:p>
-                      <a:endParaRPr lang="en-US" dirty="0"/>
-                    </a:p>
-                  </a:txBody>
-                  <a:tcPr/>
-                </a:tc>
-                <a:extLst>
-                  <a:ext uri="{0D108BD9-81ED-4DB2-BD59-A6C34878D82A}">
-                    <a16:rowId xmlns:a16="http://schemas.microsoft.com/office/drawing/2014/main" val="3263291009"/>
-                  </a:ext>
-                </a:extLst>
-              </a:tr>
-              <a:tr h="370840">
-                <a:tc>
-                  <a:txBody>
-                    <a:bodyPr/>
-                    <a:lstStyle/>
-                    <a:p>
-                      <a:endParaRPr lang="en-US"/>
-                    </a:p>
-                  </a:txBody>
-                  <a:tcPr/>
-                </a:tc>
-                <a:tc>
-                  <a:txBody>
-                    <a:bodyPr/>
-                    <a:lstStyle/>
-                    <a:p>
-                      <a:endParaRPr lang="en-US"/>
-                    </a:p>
-                  </a:txBody>
-                  <a:tcPr/>
-                </a:tc>
-                <a:tc>
-                  <a:txBody>
-                    <a:bodyPr/>
-                    <a:lstStyle/>
-                    <a:p>
-                      <a:endParaRPr lang="en-US"/>
-                    </a:p>
-                  </a:txBody>
-                  <a:tcPr/>
-                </a:tc>
-                <a:tc>
-                  <a:txBody>
-                    <a:bodyPr/>
-                    <a:lstStyle/>
-                    <a:p>
-                      <a:endParaRPr lang="en-US"/>
-                    </a:p>
-                  </a:txBody>
-                  <a:tcPr/>
-                </a:tc>
-                <a:tc>
-                  <a:txBody>
-                    <a:bodyPr/>
-                    <a:lstStyle/>
-                    <a:p>
-                      <a:endParaRPr lang="en-US"/>
-                    </a:p>
-                  </a:txBody>
-                  <a:tcPr/>
-                </a:tc>
-                <a:tc>
-                  <a:txBody>
-                    <a:bodyPr/>
-                    <a:lstStyle/>
-                    <a:p>
-                      <a:endParaRPr lang="en-US" dirty="0"/>
-                    </a:p>
-                  </a:txBody>
-                  <a:tcPr/>
-                </a:tc>
-                <a:extLst>
-                  <a:ext uri="{0D108BD9-81ED-4DB2-BD59-A6C34878D82A}">
-                    <a16:rowId xmlns:a16="http://schemas.microsoft.com/office/drawing/2014/main" val="4019253566"/>
-                  </a:ext>
-                </a:extLst>
-              </a:tr>
-              <a:tr h="370840">
-                <a:tc>
-                  <a:txBody>
-                    <a:bodyPr/>
-                    <a:lstStyle/>
-                    <a:p>
-                      <a:endParaRPr lang="en-US"/>
-                    </a:p>
-                  </a:txBody>
-                  <a:tcPr/>
-                </a:tc>
-                <a:tc>
-                  <a:txBody>
-                    <a:bodyPr/>
-                    <a:lstStyle/>
-                    <a:p>
-                      <a:endParaRPr lang="en-US"/>
-                    </a:p>
-                  </a:txBody>
-                  <a:tcPr/>
-                </a:tc>
-                <a:tc>
-                  <a:txBody>
-                    <a:bodyPr/>
-                    <a:lstStyle/>
-                    <a:p>
-                      <a:endParaRPr lang="en-US"/>
-                    </a:p>
-                  </a:txBody>
-                  <a:tcPr/>
-                </a:tc>
-                <a:tc>
-                  <a:txBody>
-                    <a:bodyPr/>
-                    <a:lstStyle/>
-                    <a:p>
-                      <a:endParaRPr lang="en-US"/>
-                    </a:p>
-                  </a:txBody>
-                  <a:tcPr/>
-                </a:tc>
-                <a:tc>
-                  <a:txBody>
-                    <a:bodyPr/>
-                    <a:lstStyle/>
-                    <a:p>
-                      <a:endParaRPr lang="en-US"/>
-                    </a:p>
-                  </a:txBody>
-                  <a:tcPr/>
-                </a:tc>
-                <a:tc>
-                  <a:txBody>
-                    <a:bodyPr/>
-                    <a:lstStyle/>
-                    <a:p>
-                      <a:endParaRPr lang="en-US" dirty="0"/>
-                    </a:p>
-                  </a:txBody>
-                  <a:tcPr/>
-                </a:tc>
-                <a:extLst>
-                  <a:ext uri="{0D108BD9-81ED-4DB2-BD59-A6C34878D82A}">
-                    <a16:rowId xmlns:a16="http://schemas.microsoft.com/office/drawing/2014/main" val="672752403"/>
-                  </a:ext>
-                </a:extLst>
-              </a:tr>
-            </a:tbl>
-          </a:graphicData>
-        </a:graphic>
-      </p:graphicFrame>
+              <a:t>Domain customizations</a:t>
+            </a:r>
+          </a:p>
+        </p:txBody>
+      </p:sp>
       <p:sp>
         <p:nvSpPr>
           <p:cNvPr id="8" name="Rectangle 7">
@@ -4121,6 +3630,302 @@
           <a:p>
             <a:pPr algn="ctr"/>
             <a:endParaRPr lang="en-US"/>
+          </a:p>
+        </p:txBody>
+      </p:sp>
+      <p:sp>
+        <p:nvSpPr>
+          <p:cNvPr id="10" name="Content Placeholder 2">
+            <a:extLst>
+              <a:ext uri="{FF2B5EF4-FFF2-40B4-BE49-F238E27FC236}">
+                <a16:creationId xmlns:a16="http://schemas.microsoft.com/office/drawing/2014/main" id="{CDDF6D09-FC27-4D82-8F75-C419ADFF5EBD}"/>
+              </a:ext>
+            </a:extLst>
+          </p:cNvPr>
+          <p:cNvSpPr txBox="1">
+            <a:spLocks/>
+          </p:cNvSpPr>
+          <p:nvPr/>
+        </p:nvSpPr>
+        <p:spPr>
+          <a:xfrm>
+            <a:off x="5822244" y="5270047"/>
+            <a:ext cx="6234463" cy="1577649"/>
+          </a:xfrm>
+          <a:prstGeom prst="rect">
+            <a:avLst/>
+          </a:prstGeom>
+        </p:spPr>
+        <p:txBody>
+          <a:bodyPr vert="horz" lIns="91440" tIns="45720" rIns="91440" bIns="45720" rtlCol="0">
+            <a:normAutofit/>
+          </a:bodyPr>
+          <a:lstStyle>
+            <a:lvl1pPr marL="228600" indent="-228600" algn="l" defTabSz="914400" rtl="0" eaLnBrk="1" latinLnBrk="0" hangingPunct="1">
+              <a:lnSpc>
+                <a:spcPct val="90000"/>
+              </a:lnSpc>
+              <a:spcBef>
+                <a:spcPts val="1000"/>
+              </a:spcBef>
+              <a:buFont typeface="Arial" panose="020B0604020202020204" pitchFamily="34" charset="0"/>
+              <a:buChar char="•"/>
+              <a:defRPr sz="2800" kern="1200">
+                <a:solidFill>
+                  <a:schemeClr val="tx1"/>
+                </a:solidFill>
+                <a:latin typeface="+mn-lt"/>
+                <a:ea typeface="+mn-ea"/>
+                <a:cs typeface="+mn-cs"/>
+              </a:defRPr>
+            </a:lvl1pPr>
+            <a:lvl2pPr marL="685800" indent="-228600" algn="l" defTabSz="914400" rtl="0" eaLnBrk="1" latinLnBrk="0" hangingPunct="1">
+              <a:lnSpc>
+                <a:spcPct val="90000"/>
+              </a:lnSpc>
+              <a:spcBef>
+                <a:spcPts val="500"/>
+              </a:spcBef>
+              <a:buFont typeface="Arial" panose="020B0604020202020204" pitchFamily="34" charset="0"/>
+              <a:buChar char="•"/>
+              <a:defRPr sz="2400" kern="1200">
+                <a:solidFill>
+                  <a:schemeClr val="tx1"/>
+                </a:solidFill>
+                <a:latin typeface="+mn-lt"/>
+                <a:ea typeface="+mn-ea"/>
+                <a:cs typeface="+mn-cs"/>
+              </a:defRPr>
+            </a:lvl2pPr>
+            <a:lvl3pPr marL="1143000" indent="-228600" algn="l" defTabSz="914400" rtl="0" eaLnBrk="1" latinLnBrk="0" hangingPunct="1">
+              <a:lnSpc>
+                <a:spcPct val="90000"/>
+              </a:lnSpc>
+              <a:spcBef>
+                <a:spcPts val="500"/>
+              </a:spcBef>
+              <a:buFont typeface="Arial" panose="020B0604020202020204" pitchFamily="34" charset="0"/>
+              <a:buChar char="•"/>
+              <a:defRPr sz="2000" kern="1200">
+                <a:solidFill>
+                  <a:schemeClr val="tx1"/>
+                </a:solidFill>
+                <a:latin typeface="+mn-lt"/>
+                <a:ea typeface="+mn-ea"/>
+                <a:cs typeface="+mn-cs"/>
+              </a:defRPr>
+            </a:lvl3pPr>
+            <a:lvl4pPr marL="1600200" indent="-228600" algn="l" defTabSz="914400" rtl="0" eaLnBrk="1" latinLnBrk="0" hangingPunct="1">
+              <a:lnSpc>
+                <a:spcPct val="90000"/>
+              </a:lnSpc>
+              <a:spcBef>
+                <a:spcPts val="500"/>
+              </a:spcBef>
+              <a:buFont typeface="Arial" panose="020B0604020202020204" pitchFamily="34" charset="0"/>
+              <a:buChar char="•"/>
+              <a:defRPr sz="1800" kern="1200">
+                <a:solidFill>
+                  <a:schemeClr val="tx1"/>
+                </a:solidFill>
+                <a:latin typeface="+mn-lt"/>
+                <a:ea typeface="+mn-ea"/>
+                <a:cs typeface="+mn-cs"/>
+              </a:defRPr>
+            </a:lvl4pPr>
+            <a:lvl5pPr marL="2057400" indent="-228600" algn="l" defTabSz="914400" rtl="0" eaLnBrk="1" latinLnBrk="0" hangingPunct="1">
+              <a:lnSpc>
+                <a:spcPct val="90000"/>
+              </a:lnSpc>
+              <a:spcBef>
+                <a:spcPts val="500"/>
+              </a:spcBef>
+              <a:buFont typeface="Arial" panose="020B0604020202020204" pitchFamily="34" charset="0"/>
+              <a:buChar char="•"/>
+              <a:defRPr sz="1800" kern="1200">
+                <a:solidFill>
+                  <a:schemeClr val="tx1"/>
+                </a:solidFill>
+                <a:latin typeface="+mn-lt"/>
+                <a:ea typeface="+mn-ea"/>
+                <a:cs typeface="+mn-cs"/>
+              </a:defRPr>
+            </a:lvl5pPr>
+            <a:lvl6pPr marL="2514600" indent="-228600" algn="l" defTabSz="914400" rtl="0" eaLnBrk="1" latinLnBrk="0" hangingPunct="1">
+              <a:lnSpc>
+                <a:spcPct val="90000"/>
+              </a:lnSpc>
+              <a:spcBef>
+                <a:spcPts val="500"/>
+              </a:spcBef>
+              <a:buFont typeface="Arial" panose="020B0604020202020204" pitchFamily="34" charset="0"/>
+              <a:buChar char="•"/>
+              <a:defRPr sz="1800" kern="1200">
+                <a:solidFill>
+                  <a:schemeClr val="tx1"/>
+                </a:solidFill>
+                <a:latin typeface="+mn-lt"/>
+                <a:ea typeface="+mn-ea"/>
+                <a:cs typeface="+mn-cs"/>
+              </a:defRPr>
+            </a:lvl6pPr>
+            <a:lvl7pPr marL="2971800" indent="-228600" algn="l" defTabSz="914400" rtl="0" eaLnBrk="1" latinLnBrk="0" hangingPunct="1">
+              <a:lnSpc>
+                <a:spcPct val="90000"/>
+              </a:lnSpc>
+              <a:spcBef>
+                <a:spcPts val="500"/>
+              </a:spcBef>
+              <a:buFont typeface="Arial" panose="020B0604020202020204" pitchFamily="34" charset="0"/>
+              <a:buChar char="•"/>
+              <a:defRPr sz="1800" kern="1200">
+                <a:solidFill>
+                  <a:schemeClr val="tx1"/>
+                </a:solidFill>
+                <a:latin typeface="+mn-lt"/>
+                <a:ea typeface="+mn-ea"/>
+                <a:cs typeface="+mn-cs"/>
+              </a:defRPr>
+            </a:lvl7pPr>
+            <a:lvl8pPr marL="3429000" indent="-228600" algn="l" defTabSz="914400" rtl="0" eaLnBrk="1" latinLnBrk="0" hangingPunct="1">
+              <a:lnSpc>
+                <a:spcPct val="90000"/>
+              </a:lnSpc>
+              <a:spcBef>
+                <a:spcPts val="500"/>
+              </a:spcBef>
+              <a:buFont typeface="Arial" panose="020B0604020202020204" pitchFamily="34" charset="0"/>
+              <a:buChar char="•"/>
+              <a:defRPr sz="1800" kern="1200">
+                <a:solidFill>
+                  <a:schemeClr val="tx1"/>
+                </a:solidFill>
+                <a:latin typeface="+mn-lt"/>
+                <a:ea typeface="+mn-ea"/>
+                <a:cs typeface="+mn-cs"/>
+              </a:defRPr>
+            </a:lvl8pPr>
+            <a:lvl9pPr marL="3886200" indent="-228600" algn="l" defTabSz="914400" rtl="0" eaLnBrk="1" latinLnBrk="0" hangingPunct="1">
+              <a:lnSpc>
+                <a:spcPct val="90000"/>
+              </a:lnSpc>
+              <a:spcBef>
+                <a:spcPts val="500"/>
+              </a:spcBef>
+              <a:buFont typeface="Arial" panose="020B0604020202020204" pitchFamily="34" charset="0"/>
+              <a:buChar char="•"/>
+              <a:defRPr sz="1800" kern="1200">
+                <a:solidFill>
+                  <a:schemeClr val="tx1"/>
+                </a:solidFill>
+                <a:latin typeface="+mn-lt"/>
+                <a:ea typeface="+mn-ea"/>
+                <a:cs typeface="+mn-cs"/>
+              </a:defRPr>
+            </a:lvl9pPr>
+          </a:lstStyle>
+          <a:p>
+            <a:pPr marL="0" indent="0">
+              <a:buNone/>
+            </a:pPr>
+            <a:r>
+              <a:rPr lang="en-US" sz="2400" dirty="0">
+                <a:latin typeface="-apple-system"/>
+              </a:rPr>
+              <a:t>Supported by NIH grant 1R44AR074375-01A1.</a:t>
+            </a:r>
+            <a:endParaRPr lang="en-US" sz="2400" dirty="0"/>
+          </a:p>
+          <a:p>
+            <a:pPr marL="0" indent="0">
+              <a:buNone/>
+            </a:pPr>
+            <a:r>
+              <a:rPr lang="en-US" sz="2400" dirty="0"/>
+              <a:t>Thanks to </a:t>
+            </a:r>
+            <a:r>
+              <a:rPr lang="en-US" sz="2400" b="0" i="0" u="none" strike="noStrike" dirty="0">
+                <a:effectLst/>
+                <a:latin typeface="-apple-system"/>
+                <a:hlinkClick r:id="rId8"/>
+              </a:rPr>
+              <a:t>Stefan Klein</a:t>
+            </a:r>
+            <a:r>
+              <a:rPr lang="en-US" sz="2400" b="0" i="0" u="none" strike="noStrike" dirty="0">
+                <a:effectLst/>
+                <a:latin typeface="-apple-system"/>
+              </a:rPr>
+              <a:t>, </a:t>
+            </a:r>
+            <a:r>
+              <a:rPr lang="en-US" sz="2400" b="0" i="0" u="none" strike="noStrike" dirty="0">
+                <a:effectLst/>
+                <a:latin typeface="-apple-system"/>
+                <a:hlinkClick r:id="rId9"/>
+              </a:rPr>
+              <a:t>Marius Staring</a:t>
+            </a:r>
+            <a:r>
+              <a:rPr lang="en-US" sz="2400" b="0" i="0" u="none" strike="noStrike" dirty="0">
+                <a:effectLst/>
+                <a:latin typeface="-apple-system"/>
+              </a:rPr>
+              <a:t>, </a:t>
+            </a:r>
+            <a:r>
+              <a:rPr lang="en-US" sz="2400" b="0" i="0" u="none" strike="noStrike" dirty="0">
+                <a:effectLst/>
+                <a:latin typeface="-apple-system"/>
+                <a:hlinkClick r:id="rId10"/>
+              </a:rPr>
+              <a:t>Kasper </a:t>
+            </a:r>
+            <a:r>
+              <a:rPr lang="en-US" sz="2400" b="0" i="0" u="none" strike="noStrike" dirty="0" err="1">
+                <a:effectLst/>
+                <a:latin typeface="-apple-system"/>
+                <a:hlinkClick r:id="rId10"/>
+              </a:rPr>
+              <a:t>Marstal</a:t>
+            </a:r>
+            <a:r>
+              <a:rPr lang="en-US" sz="2400" b="0" i="0" u="none" strike="noStrike" dirty="0">
+                <a:effectLst/>
+                <a:latin typeface="-apple-system"/>
+              </a:rPr>
+              <a:t>, </a:t>
+            </a:r>
+            <a:r>
+              <a:rPr lang="en-US" sz="2400" b="0" i="0" u="none" strike="noStrike" dirty="0">
+                <a:effectLst/>
+                <a:latin typeface="-apple-system"/>
+                <a:hlinkClick r:id="rId11"/>
+              </a:rPr>
+              <a:t>Niels Dekker</a:t>
+            </a:r>
+            <a:r>
+              <a:rPr lang="en-US" sz="2400" b="0" i="0" u="none" strike="noStrike" dirty="0">
+                <a:effectLst/>
+                <a:latin typeface="-apple-system"/>
+              </a:rPr>
+              <a:t> and all of </a:t>
+            </a:r>
+            <a:r>
+              <a:rPr lang="en-US" sz="2400" b="0" i="0" u="none" strike="noStrike" dirty="0" err="1">
+                <a:effectLst/>
+                <a:latin typeface="-apple-system"/>
+              </a:rPr>
+              <a:t>Elastix</a:t>
+            </a:r>
+            <a:r>
+              <a:rPr lang="en-US" sz="2400" b="0" i="0" u="none" strike="noStrike" dirty="0">
+                <a:effectLst/>
+                <a:latin typeface="-apple-system"/>
+              </a:rPr>
+              <a:t> team.</a:t>
+            </a:r>
           </a:p>
         </p:txBody>
       </p:sp>

</xml_diff>